<commit_message>
completed second milestone edit #95
</commit_message>
<xml_diff>
--- a/report/report_images.pptx
+++ b/report/report_images.pptx
@@ -6,6 +6,7 @@
   </p:sldMasterIdLst>
   <p:sldIdLst>
     <p:sldId id="256" r:id="rId2"/>
+    <p:sldId id="257" r:id="rId3"/>
   </p:sldIdLst>
   <p:sldSz cx="12192000" cy="6858000"/>
   <p:notesSz cx="6858000" cy="9144000"/>
@@ -3344,58 +3345,1184 @@
       </p:grpSpPr>
       <p:sp>
         <p:nvSpPr>
-          <p:cNvPr id="2" name="Title 1">
-            <a:extLst>
-              <a:ext uri="{FF2B5EF4-FFF2-40B4-BE49-F238E27FC236}">
-                <a16:creationId xmlns:a16="http://schemas.microsoft.com/office/drawing/2014/main" id="{512C0C3A-8BE2-4202-8CA2-0FA767A03824}"/>
-              </a:ext>
-            </a:extLst>
-          </p:cNvPr>
-          <p:cNvSpPr>
-            <a:spLocks noGrp="1"/>
-          </p:cNvSpPr>
-          <p:nvPr>
-            <p:ph type="ctrTitle"/>
-          </p:nvPr>
-        </p:nvSpPr>
-        <p:spPr/>
-        <p:txBody>
-          <a:bodyPr/>
-          <a:lstStyle/>
-          <a:p>
-            <a:endParaRPr lang="en-CA"/>
-          </a:p>
-        </p:txBody>
-      </p:sp>
-      <p:sp>
-        <p:nvSpPr>
-          <p:cNvPr id="3" name="Subtitle 2">
-            <a:extLst>
-              <a:ext uri="{FF2B5EF4-FFF2-40B4-BE49-F238E27FC236}">
-                <a16:creationId xmlns:a16="http://schemas.microsoft.com/office/drawing/2014/main" id="{0CC11D4F-76D5-4E26-874D-5E5DDC5CABC8}"/>
-              </a:ext>
-            </a:extLst>
-          </p:cNvPr>
-          <p:cNvSpPr>
-            <a:spLocks noGrp="1"/>
-          </p:cNvSpPr>
-          <p:nvPr>
-            <p:ph type="subTitle" idx="1"/>
-          </p:nvPr>
-        </p:nvSpPr>
-        <p:spPr/>
-        <p:txBody>
-          <a:bodyPr/>
-          <a:lstStyle/>
-          <a:p>
-            <a:endParaRPr lang="en-CA"/>
-          </a:p>
-        </p:txBody>
-      </p:sp>
+          <p:cNvPr id="30" name="Rectangle 29">
+            <a:extLst>
+              <a:ext uri="{FF2B5EF4-FFF2-40B4-BE49-F238E27FC236}">
+                <a16:creationId xmlns:a16="http://schemas.microsoft.com/office/drawing/2014/main" id="{5DA31DB9-EA07-44CF-962F-C54221F4CF89}"/>
+              </a:ext>
+            </a:extLst>
+          </p:cNvPr>
+          <p:cNvSpPr/>
+          <p:nvPr/>
+        </p:nvSpPr>
+        <p:spPr>
+          <a:xfrm>
+            <a:off x="7788441" y="779317"/>
+            <a:ext cx="3621505" cy="3830418"/>
+          </a:xfrm>
+          <a:prstGeom prst="rect">
+            <a:avLst/>
+          </a:prstGeom>
+        </p:spPr>
+        <p:style>
+          <a:lnRef idx="2">
+            <a:schemeClr val="accent1">
+              <a:shade val="50000"/>
+            </a:schemeClr>
+          </a:lnRef>
+          <a:fillRef idx="1">
+            <a:schemeClr val="accent1"/>
+          </a:fillRef>
+          <a:effectRef idx="0">
+            <a:schemeClr val="accent1"/>
+          </a:effectRef>
+          <a:fontRef idx="minor">
+            <a:schemeClr val="lt1"/>
+          </a:fontRef>
+        </p:style>
+        <p:txBody>
+          <a:bodyPr rtlCol="0" anchor="ctr"/>
+          <a:lstStyle/>
+          <a:p>
+            <a:pPr algn="ctr"/>
+            <a:endParaRPr lang="en-CA" dirty="0"/>
+          </a:p>
+        </p:txBody>
+      </p:sp>
+      <p:pic>
+        <p:nvPicPr>
+          <p:cNvPr id="6" name="Picture 5" descr="Icon&#10;&#10;Description automatically generated">
+            <a:extLst>
+              <a:ext uri="{FF2B5EF4-FFF2-40B4-BE49-F238E27FC236}">
+                <a16:creationId xmlns:a16="http://schemas.microsoft.com/office/drawing/2014/main" id="{E6B5018E-DDE7-49A2-978B-DF84CDB4AFDD}"/>
+              </a:ext>
+            </a:extLst>
+          </p:cNvPr>
+          <p:cNvPicPr>
+            <a:picLocks noChangeAspect="1"/>
+          </p:cNvPicPr>
+          <p:nvPr/>
+        </p:nvPicPr>
+        <p:blipFill>
+          <a:blip r:embed="rId2">
+            <a:extLst>
+              <a:ext uri="{28A0092B-C50C-407E-A947-70E740481C1C}">
+                <a14:useLocalDpi xmlns:a14="http://schemas.microsoft.com/office/drawing/2010/main" val="0"/>
+              </a:ext>
+            </a:extLst>
+          </a:blip>
+          <a:stretch>
+            <a:fillRect/>
+          </a:stretch>
+        </p:blipFill>
+        <p:spPr>
+          <a:xfrm>
+            <a:off x="1944521" y="1934414"/>
+            <a:ext cx="540000" cy="531360"/>
+          </a:xfrm>
+          <a:prstGeom prst="rect">
+            <a:avLst/>
+          </a:prstGeom>
+        </p:spPr>
+      </p:pic>
+      <p:sp>
+        <p:nvSpPr>
+          <p:cNvPr id="11" name="Rectangle: Rounded Corners 10">
+            <a:extLst>
+              <a:ext uri="{FF2B5EF4-FFF2-40B4-BE49-F238E27FC236}">
+                <a16:creationId xmlns:a16="http://schemas.microsoft.com/office/drawing/2014/main" id="{B865FB14-E9CF-4B08-B3CB-13F4628C3D24}"/>
+              </a:ext>
+            </a:extLst>
+          </p:cNvPr>
+          <p:cNvSpPr/>
+          <p:nvPr/>
+        </p:nvSpPr>
+        <p:spPr>
+          <a:xfrm>
+            <a:off x="2899788" y="1855043"/>
+            <a:ext cx="540000" cy="540000"/>
+          </a:xfrm>
+          <a:prstGeom prst="roundRect">
+            <a:avLst/>
+          </a:prstGeom>
+          <a:solidFill>
+            <a:srgbClr val="C00000"/>
+          </a:solidFill>
+          <a:ln>
+            <a:noFill/>
+          </a:ln>
+        </p:spPr>
+        <p:style>
+          <a:lnRef idx="2">
+            <a:schemeClr val="accent1">
+              <a:shade val="50000"/>
+            </a:schemeClr>
+          </a:lnRef>
+          <a:fillRef idx="1">
+            <a:schemeClr val="accent1"/>
+          </a:fillRef>
+          <a:effectRef idx="0">
+            <a:schemeClr val="accent1"/>
+          </a:effectRef>
+          <a:fontRef idx="minor">
+            <a:schemeClr val="lt1"/>
+          </a:fontRef>
+        </p:style>
+        <p:txBody>
+          <a:bodyPr rtlCol="0" anchor="ctr"/>
+          <a:lstStyle/>
+          <a:p>
+            <a:pPr algn="ctr"/>
+            <a:endParaRPr lang="en-CA"/>
+          </a:p>
+        </p:txBody>
+      </p:sp>
+      <p:sp>
+        <p:nvSpPr>
+          <p:cNvPr id="7" name="TextBox 6">
+            <a:extLst>
+              <a:ext uri="{FF2B5EF4-FFF2-40B4-BE49-F238E27FC236}">
+                <a16:creationId xmlns:a16="http://schemas.microsoft.com/office/drawing/2014/main" id="{5588A16D-BB6C-4E0B-A805-C508F8C3792C}"/>
+              </a:ext>
+            </a:extLst>
+          </p:cNvPr>
+          <p:cNvSpPr txBox="1"/>
+          <p:nvPr/>
+        </p:nvSpPr>
+        <p:spPr>
+          <a:xfrm>
+            <a:off x="1817447" y="2384413"/>
+            <a:ext cx="806117" cy="246221"/>
+          </a:xfrm>
+          <a:prstGeom prst="rect">
+            <a:avLst/>
+          </a:prstGeom>
+          <a:noFill/>
+        </p:spPr>
+        <p:txBody>
+          <a:bodyPr wrap="square" rtlCol="0">
+            <a:spAutoFit/>
+          </a:bodyPr>
+          <a:lstStyle/>
+          <a:p>
+            <a:pPr algn="ctr"/>
+            <a:r>
+              <a:rPr lang="en-CA" sz="1000" b="1" dirty="0">
+                <a:solidFill>
+                  <a:srgbClr val="C00000"/>
+                </a:solidFill>
+              </a:rPr>
+              <a:t>Kubernetes</a:t>
+            </a:r>
+          </a:p>
+        </p:txBody>
+      </p:sp>
+      <p:pic>
+        <p:nvPicPr>
+          <p:cNvPr id="9" name="Graphic 8" descr="Key outline">
+            <a:extLst>
+              <a:ext uri="{FF2B5EF4-FFF2-40B4-BE49-F238E27FC236}">
+                <a16:creationId xmlns:a16="http://schemas.microsoft.com/office/drawing/2014/main" id="{1621FB5B-611C-4026-BAB9-8D1C6CDCFC19}"/>
+              </a:ext>
+            </a:extLst>
+          </p:cNvPr>
+          <p:cNvPicPr>
+            <a:picLocks noChangeAspect="1"/>
+          </p:cNvPicPr>
+          <p:nvPr/>
+        </p:nvPicPr>
+        <p:blipFill>
+          <a:blip r:embed="rId3">
+            <a:extLst>
+              <a:ext uri="{28A0092B-C50C-407E-A947-70E740481C1C}">
+                <a14:useLocalDpi xmlns:a14="http://schemas.microsoft.com/office/drawing/2010/main" val="0"/>
+              </a:ext>
+              <a:ext uri="{96DAC541-7B7A-43D3-8B79-37D633B846F1}">
+                <asvg:svgBlip xmlns:asvg="http://schemas.microsoft.com/office/drawing/2016/SVG/main" r:embed="rId4"/>
+              </a:ext>
+            </a:extLst>
+          </a:blip>
+          <a:stretch>
+            <a:fillRect/>
+          </a:stretch>
+        </p:blipFill>
+        <p:spPr>
+          <a:xfrm>
+            <a:off x="2906919" y="1844413"/>
+            <a:ext cx="540000" cy="540000"/>
+          </a:xfrm>
+          <a:prstGeom prst="rect">
+            <a:avLst/>
+          </a:prstGeom>
+        </p:spPr>
+      </p:pic>
+      <p:sp>
+        <p:nvSpPr>
+          <p:cNvPr id="12" name="Rectangle: Rounded Corners 11">
+            <a:extLst>
+              <a:ext uri="{FF2B5EF4-FFF2-40B4-BE49-F238E27FC236}">
+                <a16:creationId xmlns:a16="http://schemas.microsoft.com/office/drawing/2014/main" id="{F789117B-0604-4C69-816F-D8F35078CE0E}"/>
+              </a:ext>
+            </a:extLst>
+          </p:cNvPr>
+          <p:cNvSpPr/>
+          <p:nvPr/>
+        </p:nvSpPr>
+        <p:spPr>
+          <a:xfrm>
+            <a:off x="2562726" y="1707956"/>
+            <a:ext cx="3001879" cy="1011181"/>
+          </a:xfrm>
+          <a:prstGeom prst="roundRect">
+            <a:avLst/>
+          </a:prstGeom>
+          <a:noFill/>
+          <a:ln w="19050">
+            <a:solidFill>
+              <a:srgbClr val="C00000"/>
+            </a:solidFill>
+          </a:ln>
+        </p:spPr>
+        <p:style>
+          <a:lnRef idx="2">
+            <a:schemeClr val="accent1">
+              <a:shade val="50000"/>
+            </a:schemeClr>
+          </a:lnRef>
+          <a:fillRef idx="1">
+            <a:schemeClr val="accent1"/>
+          </a:fillRef>
+          <a:effectRef idx="0">
+            <a:schemeClr val="accent1"/>
+          </a:effectRef>
+          <a:fontRef idx="minor">
+            <a:schemeClr val="lt1"/>
+          </a:fontRef>
+        </p:style>
+        <p:txBody>
+          <a:bodyPr rtlCol="0" anchor="ctr"/>
+          <a:lstStyle/>
+          <a:p>
+            <a:pPr algn="ctr"/>
+            <a:endParaRPr lang="en-CA"/>
+          </a:p>
+        </p:txBody>
+      </p:sp>
+      <p:sp>
+        <p:nvSpPr>
+          <p:cNvPr id="13" name="TextBox 12">
+            <a:extLst>
+              <a:ext uri="{FF2B5EF4-FFF2-40B4-BE49-F238E27FC236}">
+                <a16:creationId xmlns:a16="http://schemas.microsoft.com/office/drawing/2014/main" id="{6D5B6AD6-F96C-4AF0-BACE-D7722AE29ECA}"/>
+              </a:ext>
+            </a:extLst>
+          </p:cNvPr>
+          <p:cNvSpPr txBox="1"/>
+          <p:nvPr/>
+        </p:nvSpPr>
+        <p:spPr>
+          <a:xfrm>
+            <a:off x="2596912" y="2384413"/>
+            <a:ext cx="1113794" cy="246221"/>
+          </a:xfrm>
+          <a:prstGeom prst="rect">
+            <a:avLst/>
+          </a:prstGeom>
+          <a:noFill/>
+        </p:spPr>
+        <p:txBody>
+          <a:bodyPr wrap="square" rtlCol="0">
+            <a:spAutoFit/>
+          </a:bodyPr>
+          <a:lstStyle/>
+          <a:p>
+            <a:pPr algn="ctr"/>
+            <a:r>
+              <a:rPr lang="en-CA" sz="1000" b="1" dirty="0">
+                <a:solidFill>
+                  <a:srgbClr val="C00000"/>
+                </a:solidFill>
+              </a:rPr>
+              <a:t>Authentication</a:t>
+            </a:r>
+          </a:p>
+        </p:txBody>
+      </p:sp>
+      <p:sp>
+        <p:nvSpPr>
+          <p:cNvPr id="19" name="Rectangle: Rounded Corners 18">
+            <a:extLst>
+              <a:ext uri="{FF2B5EF4-FFF2-40B4-BE49-F238E27FC236}">
+                <a16:creationId xmlns:a16="http://schemas.microsoft.com/office/drawing/2014/main" id="{ED34ABE3-9878-4DAA-999A-9525C8B201A0}"/>
+              </a:ext>
+            </a:extLst>
+          </p:cNvPr>
+          <p:cNvSpPr/>
+          <p:nvPr/>
+        </p:nvSpPr>
+        <p:spPr>
+          <a:xfrm>
+            <a:off x="3801548" y="1844413"/>
+            <a:ext cx="540000" cy="540000"/>
+          </a:xfrm>
+          <a:prstGeom prst="roundRect">
+            <a:avLst/>
+          </a:prstGeom>
+          <a:solidFill>
+            <a:srgbClr val="C00000"/>
+          </a:solidFill>
+          <a:ln>
+            <a:noFill/>
+          </a:ln>
+        </p:spPr>
+        <p:style>
+          <a:lnRef idx="2">
+            <a:schemeClr val="accent1">
+              <a:shade val="50000"/>
+            </a:schemeClr>
+          </a:lnRef>
+          <a:fillRef idx="1">
+            <a:schemeClr val="accent1"/>
+          </a:fillRef>
+          <a:effectRef idx="0">
+            <a:schemeClr val="accent1"/>
+          </a:effectRef>
+          <a:fontRef idx="minor">
+            <a:schemeClr val="lt1"/>
+          </a:fontRef>
+        </p:style>
+        <p:txBody>
+          <a:bodyPr rtlCol="0" anchor="ctr"/>
+          <a:lstStyle/>
+          <a:p>
+            <a:pPr algn="ctr"/>
+            <a:endParaRPr lang="en-CA"/>
+          </a:p>
+        </p:txBody>
+      </p:sp>
+      <p:sp>
+        <p:nvSpPr>
+          <p:cNvPr id="20" name="Rectangle: Rounded Corners 19">
+            <a:extLst>
+              <a:ext uri="{FF2B5EF4-FFF2-40B4-BE49-F238E27FC236}">
+                <a16:creationId xmlns:a16="http://schemas.microsoft.com/office/drawing/2014/main" id="{47E09F7E-BAAB-429E-BFA0-ED4B6E70084B}"/>
+              </a:ext>
+            </a:extLst>
+          </p:cNvPr>
+          <p:cNvSpPr/>
+          <p:nvPr/>
+        </p:nvSpPr>
+        <p:spPr>
+          <a:xfrm>
+            <a:off x="4703308" y="1844413"/>
+            <a:ext cx="540000" cy="540000"/>
+          </a:xfrm>
+          <a:prstGeom prst="roundRect">
+            <a:avLst/>
+          </a:prstGeom>
+          <a:solidFill>
+            <a:srgbClr val="C00000"/>
+          </a:solidFill>
+          <a:ln>
+            <a:noFill/>
+          </a:ln>
+        </p:spPr>
+        <p:style>
+          <a:lnRef idx="2">
+            <a:schemeClr val="accent1">
+              <a:shade val="50000"/>
+            </a:schemeClr>
+          </a:lnRef>
+          <a:fillRef idx="1">
+            <a:schemeClr val="accent1"/>
+          </a:fillRef>
+          <a:effectRef idx="0">
+            <a:schemeClr val="accent1"/>
+          </a:effectRef>
+          <a:fontRef idx="minor">
+            <a:schemeClr val="lt1"/>
+          </a:fontRef>
+        </p:style>
+        <p:txBody>
+          <a:bodyPr rtlCol="0" anchor="ctr"/>
+          <a:lstStyle/>
+          <a:p>
+            <a:pPr algn="ctr"/>
+            <a:endParaRPr lang="en-CA"/>
+          </a:p>
+        </p:txBody>
+      </p:sp>
+      <p:pic>
+        <p:nvPicPr>
+          <p:cNvPr id="15" name="Graphic 14" descr="Music note with solid fill">
+            <a:extLst>
+              <a:ext uri="{FF2B5EF4-FFF2-40B4-BE49-F238E27FC236}">
+                <a16:creationId xmlns:a16="http://schemas.microsoft.com/office/drawing/2014/main" id="{3015F379-CA7E-4511-854B-EDE7DDBC49A9}"/>
+              </a:ext>
+            </a:extLst>
+          </p:cNvPr>
+          <p:cNvPicPr>
+            <a:picLocks noChangeAspect="1"/>
+          </p:cNvPicPr>
+          <p:nvPr/>
+        </p:nvPicPr>
+        <p:blipFill>
+          <a:blip r:embed="rId5">
+            <a:extLst>
+              <a:ext uri="{28A0092B-C50C-407E-A947-70E740481C1C}">
+                <a14:useLocalDpi xmlns:a14="http://schemas.microsoft.com/office/drawing/2010/main" val="0"/>
+              </a:ext>
+              <a:ext uri="{96DAC541-7B7A-43D3-8B79-37D633B846F1}">
+                <asvg:svgBlip xmlns:asvg="http://schemas.microsoft.com/office/drawing/2016/SVG/main" r:embed="rId6"/>
+              </a:ext>
+            </a:extLst>
+          </a:blip>
+          <a:stretch>
+            <a:fillRect/>
+          </a:stretch>
+        </p:blipFill>
+        <p:spPr>
+          <a:xfrm>
+            <a:off x="4073284" y="1947625"/>
+            <a:ext cx="360000" cy="447418"/>
+          </a:xfrm>
+          <a:prstGeom prst="rect">
+            <a:avLst/>
+          </a:prstGeom>
+        </p:spPr>
+      </p:pic>
+      <p:pic>
+        <p:nvPicPr>
+          <p:cNvPr id="17" name="Graphic 16" descr="Hamburger Menu Icon with solid fill">
+            <a:extLst>
+              <a:ext uri="{FF2B5EF4-FFF2-40B4-BE49-F238E27FC236}">
+                <a16:creationId xmlns:a16="http://schemas.microsoft.com/office/drawing/2014/main" id="{CFAF9C59-0EFF-4432-84E8-044EE067D9B8}"/>
+              </a:ext>
+            </a:extLst>
+          </p:cNvPr>
+          <p:cNvPicPr>
+            <a:picLocks noChangeAspect="1"/>
+          </p:cNvPicPr>
+          <p:nvPr/>
+        </p:nvPicPr>
+        <p:blipFill>
+          <a:blip r:embed="rId7">
+            <a:extLst>
+              <a:ext uri="{28A0092B-C50C-407E-A947-70E740481C1C}">
+                <a14:useLocalDpi xmlns:a14="http://schemas.microsoft.com/office/drawing/2010/main" val="0"/>
+              </a:ext>
+              <a:ext uri="{96DAC541-7B7A-43D3-8B79-37D633B846F1}">
+                <asvg:svgBlip xmlns:asvg="http://schemas.microsoft.com/office/drawing/2016/SVG/main" r:embed="rId8"/>
+              </a:ext>
+            </a:extLst>
+          </a:blip>
+          <a:stretch>
+            <a:fillRect/>
+          </a:stretch>
+        </p:blipFill>
+        <p:spPr>
+          <a:xfrm>
+            <a:off x="3883137" y="1934413"/>
+            <a:ext cx="360000" cy="360000"/>
+          </a:xfrm>
+          <a:prstGeom prst="rect">
+            <a:avLst/>
+          </a:prstGeom>
+        </p:spPr>
+      </p:pic>
+      <p:sp>
+        <p:nvSpPr>
+          <p:cNvPr id="21" name="TextBox 20">
+            <a:extLst>
+              <a:ext uri="{FF2B5EF4-FFF2-40B4-BE49-F238E27FC236}">
+                <a16:creationId xmlns:a16="http://schemas.microsoft.com/office/drawing/2014/main" id="{D9858DF1-0551-4598-BA53-9691C320CC0C}"/>
+              </a:ext>
+            </a:extLst>
+          </p:cNvPr>
+          <p:cNvSpPr txBox="1"/>
+          <p:nvPr/>
+        </p:nvSpPr>
+        <p:spPr>
+          <a:xfrm>
+            <a:off x="3781120" y="2385853"/>
+            <a:ext cx="572854" cy="246221"/>
+          </a:xfrm>
+          <a:prstGeom prst="rect">
+            <a:avLst/>
+          </a:prstGeom>
+          <a:noFill/>
+        </p:spPr>
+        <p:txBody>
+          <a:bodyPr wrap="square" rtlCol="0">
+            <a:spAutoFit/>
+          </a:bodyPr>
+          <a:lstStyle/>
+          <a:p>
+            <a:pPr algn="ctr"/>
+            <a:r>
+              <a:rPr lang="en-CA" sz="1000" b="1" dirty="0">
+                <a:solidFill>
+                  <a:srgbClr val="C00000"/>
+                </a:solidFill>
+              </a:rPr>
+              <a:t>Playlist</a:t>
+            </a:r>
+          </a:p>
+        </p:txBody>
+      </p:sp>
+      <p:pic>
+        <p:nvPicPr>
+          <p:cNvPr id="23" name="Graphic 22" descr="Monthly calendar with solid fill">
+            <a:extLst>
+              <a:ext uri="{FF2B5EF4-FFF2-40B4-BE49-F238E27FC236}">
+                <a16:creationId xmlns:a16="http://schemas.microsoft.com/office/drawing/2014/main" id="{F80DA01B-71B5-4FF7-BEC5-E3E0CD82A08A}"/>
+              </a:ext>
+            </a:extLst>
+          </p:cNvPr>
+          <p:cNvPicPr>
+            <a:picLocks noChangeAspect="1"/>
+          </p:cNvPicPr>
+          <p:nvPr/>
+        </p:nvPicPr>
+        <p:blipFill>
+          <a:blip r:embed="rId9">
+            <a:extLst>
+              <a:ext uri="{28A0092B-C50C-407E-A947-70E740481C1C}">
+                <a14:useLocalDpi xmlns:a14="http://schemas.microsoft.com/office/drawing/2010/main" val="0"/>
+              </a:ext>
+              <a:ext uri="{96DAC541-7B7A-43D3-8B79-37D633B846F1}">
+                <asvg:svgBlip xmlns:asvg="http://schemas.microsoft.com/office/drawing/2016/SVG/main" r:embed="rId10"/>
+              </a:ext>
+            </a:extLst>
+          </a:blip>
+          <a:stretch>
+            <a:fillRect/>
+          </a:stretch>
+        </p:blipFill>
+        <p:spPr>
+          <a:xfrm flipH="1" flipV="1">
+            <a:off x="4703308" y="1844413"/>
+            <a:ext cx="540000" cy="540000"/>
+          </a:xfrm>
+          <a:prstGeom prst="rect">
+            <a:avLst/>
+          </a:prstGeom>
+        </p:spPr>
+      </p:pic>
+      <p:sp>
+        <p:nvSpPr>
+          <p:cNvPr id="24" name="TextBox 23">
+            <a:extLst>
+              <a:ext uri="{FF2B5EF4-FFF2-40B4-BE49-F238E27FC236}">
+                <a16:creationId xmlns:a16="http://schemas.microsoft.com/office/drawing/2014/main" id="{5F226327-FE29-4954-99B1-0D18CBA4F65D}"/>
+              </a:ext>
+            </a:extLst>
+          </p:cNvPr>
+          <p:cNvSpPr txBox="1"/>
+          <p:nvPr/>
+        </p:nvSpPr>
+        <p:spPr>
+          <a:xfrm>
+            <a:off x="4535659" y="2395043"/>
+            <a:ext cx="870326" cy="246221"/>
+          </a:xfrm>
+          <a:prstGeom prst="rect">
+            <a:avLst/>
+          </a:prstGeom>
+          <a:noFill/>
+        </p:spPr>
+        <p:txBody>
+          <a:bodyPr wrap="square" rtlCol="0">
+            <a:spAutoFit/>
+          </a:bodyPr>
+          <a:lstStyle/>
+          <a:p>
+            <a:pPr algn="ctr"/>
+            <a:r>
+              <a:rPr lang="en-CA" sz="1000" b="1" dirty="0">
+                <a:solidFill>
+                  <a:srgbClr val="C00000"/>
+                </a:solidFill>
+              </a:rPr>
+              <a:t>Subscription</a:t>
+            </a:r>
+          </a:p>
+        </p:txBody>
+      </p:sp>
+      <p:pic>
+        <p:nvPicPr>
+          <p:cNvPr id="1026" name="Picture 2" descr="Amazon DynamoDB - Wikipedia">
+            <a:extLst>
+              <a:ext uri="{FF2B5EF4-FFF2-40B4-BE49-F238E27FC236}">
+                <a16:creationId xmlns:a16="http://schemas.microsoft.com/office/drawing/2014/main" id="{AE77FDBE-DEE8-45F6-80B1-E6EC9701AA75}"/>
+              </a:ext>
+            </a:extLst>
+          </p:cNvPr>
+          <p:cNvPicPr>
+            <a:picLocks noChangeAspect="1" noChangeArrowheads="1"/>
+          </p:cNvPicPr>
+          <p:nvPr/>
+        </p:nvPicPr>
+        <p:blipFill>
+          <a:blip r:embed="rId11">
+            <a:extLst>
+              <a:ext uri="{28A0092B-C50C-407E-A947-70E740481C1C}">
+                <a14:useLocalDpi xmlns:a14="http://schemas.microsoft.com/office/drawing/2010/main" val="0"/>
+              </a:ext>
+            </a:extLst>
+          </a:blip>
+          <a:srcRect/>
+          <a:stretch>
+            <a:fillRect/>
+          </a:stretch>
+        </p:blipFill>
+        <p:spPr bwMode="auto">
+          <a:xfrm>
+            <a:off x="3801547" y="609820"/>
+            <a:ext cx="540000" cy="488442"/>
+          </a:xfrm>
+          <a:prstGeom prst="rect">
+            <a:avLst/>
+          </a:prstGeom>
+          <a:noFill/>
+          <a:extLst>
+            <a:ext uri="{909E8E84-426E-40DD-AFC4-6F175D3DCCD1}">
+              <a14:hiddenFill xmlns:a14="http://schemas.microsoft.com/office/drawing/2010/main">
+                <a:solidFill>
+                  <a:srgbClr val="FFFFFF"/>
+                </a:solidFill>
+              </a14:hiddenFill>
+            </a:ext>
+          </a:extLst>
+        </p:spPr>
+      </p:pic>
+      <p:sp>
+        <p:nvSpPr>
+          <p:cNvPr id="27" name="TextBox 26">
+            <a:extLst>
+              <a:ext uri="{FF2B5EF4-FFF2-40B4-BE49-F238E27FC236}">
+                <a16:creationId xmlns:a16="http://schemas.microsoft.com/office/drawing/2014/main" id="{3AE7DE05-5212-46AE-B9F0-F654190FC139}"/>
+              </a:ext>
+            </a:extLst>
+          </p:cNvPr>
+          <p:cNvSpPr txBox="1"/>
+          <p:nvPr/>
+        </p:nvSpPr>
+        <p:spPr>
+          <a:xfrm>
+            <a:off x="3668489" y="1104868"/>
+            <a:ext cx="806117" cy="246221"/>
+          </a:xfrm>
+          <a:prstGeom prst="rect">
+            <a:avLst/>
+          </a:prstGeom>
+          <a:noFill/>
+        </p:spPr>
+        <p:txBody>
+          <a:bodyPr wrap="square" rtlCol="0">
+            <a:spAutoFit/>
+          </a:bodyPr>
+          <a:lstStyle/>
+          <a:p>
+            <a:pPr algn="ctr"/>
+            <a:r>
+              <a:rPr lang="en-CA" sz="1000" b="1" dirty="0">
+                <a:solidFill>
+                  <a:srgbClr val="C00000"/>
+                </a:solidFill>
+              </a:rPr>
+              <a:t>Dynamo DB</a:t>
+            </a:r>
+          </a:p>
+        </p:txBody>
+      </p:sp>
+      <p:cxnSp>
+        <p:nvCxnSpPr>
+          <p:cNvPr id="34" name="Straight Arrow Connector 33">
+            <a:extLst>
+              <a:ext uri="{FF2B5EF4-FFF2-40B4-BE49-F238E27FC236}">
+                <a16:creationId xmlns:a16="http://schemas.microsoft.com/office/drawing/2014/main" id="{A3499DC7-D751-4C0B-AC4A-053B9B345798}"/>
+              </a:ext>
+            </a:extLst>
+          </p:cNvPr>
+          <p:cNvCxnSpPr>
+            <a:cxnSpLocks/>
+          </p:cNvCxnSpPr>
+          <p:nvPr/>
+        </p:nvCxnSpPr>
+        <p:spPr>
+          <a:xfrm>
+            <a:off x="4071547" y="1300162"/>
+            <a:ext cx="0" cy="360000"/>
+          </a:xfrm>
+          <a:prstGeom prst="straightConnector1">
+            <a:avLst/>
+          </a:prstGeom>
+          <a:ln w="28575">
+            <a:solidFill>
+              <a:srgbClr val="C00000"/>
+            </a:solidFill>
+            <a:headEnd type="triangle"/>
+            <a:tailEnd type="triangle"/>
+          </a:ln>
+        </p:spPr>
+        <p:style>
+          <a:lnRef idx="1">
+            <a:schemeClr val="accent1"/>
+          </a:lnRef>
+          <a:fillRef idx="0">
+            <a:schemeClr val="accent1"/>
+          </a:fillRef>
+          <a:effectRef idx="0">
+            <a:schemeClr val="accent1"/>
+          </a:effectRef>
+          <a:fontRef idx="minor">
+            <a:schemeClr val="tx1"/>
+          </a:fontRef>
+        </p:style>
+      </p:cxnSp>
+      <p:cxnSp>
+        <p:nvCxnSpPr>
+          <p:cNvPr id="41" name="Straight Arrow Connector 40">
+            <a:extLst>
+              <a:ext uri="{FF2B5EF4-FFF2-40B4-BE49-F238E27FC236}">
+                <a16:creationId xmlns:a16="http://schemas.microsoft.com/office/drawing/2014/main" id="{8BCC6B52-B4BB-411E-9D7B-970239F59716}"/>
+              </a:ext>
+            </a:extLst>
+          </p:cNvPr>
+          <p:cNvCxnSpPr>
+            <a:cxnSpLocks/>
+            <a:stCxn id="27" idx="1"/>
+          </p:cNvCxnSpPr>
+          <p:nvPr/>
+        </p:nvCxnSpPr>
+        <p:spPr>
+          <a:xfrm flipH="1">
+            <a:off x="3176919" y="1227979"/>
+            <a:ext cx="491570" cy="432183"/>
+          </a:xfrm>
+          <a:prstGeom prst="straightConnector1">
+            <a:avLst/>
+          </a:prstGeom>
+          <a:ln w="28575">
+            <a:solidFill>
+              <a:srgbClr val="C00000"/>
+            </a:solidFill>
+            <a:headEnd type="triangle"/>
+            <a:tailEnd type="triangle"/>
+          </a:ln>
+        </p:spPr>
+        <p:style>
+          <a:lnRef idx="1">
+            <a:schemeClr val="accent1"/>
+          </a:lnRef>
+          <a:fillRef idx="0">
+            <a:schemeClr val="accent1"/>
+          </a:fillRef>
+          <a:effectRef idx="0">
+            <a:schemeClr val="accent1"/>
+          </a:effectRef>
+          <a:fontRef idx="minor">
+            <a:schemeClr val="tx1"/>
+          </a:fontRef>
+        </p:style>
+      </p:cxnSp>
+      <p:cxnSp>
+        <p:nvCxnSpPr>
+          <p:cNvPr id="44" name="Straight Arrow Connector 43">
+            <a:extLst>
+              <a:ext uri="{FF2B5EF4-FFF2-40B4-BE49-F238E27FC236}">
+                <a16:creationId xmlns:a16="http://schemas.microsoft.com/office/drawing/2014/main" id="{78B8BC86-08EA-4760-B935-EED6DFF0B157}"/>
+              </a:ext>
+            </a:extLst>
+          </p:cNvPr>
+          <p:cNvCxnSpPr>
+            <a:cxnSpLocks/>
+            <a:stCxn id="27" idx="3"/>
+          </p:cNvCxnSpPr>
+          <p:nvPr/>
+        </p:nvCxnSpPr>
+        <p:spPr>
+          <a:xfrm>
+            <a:off x="4474606" y="1227979"/>
+            <a:ext cx="469798" cy="432183"/>
+          </a:xfrm>
+          <a:prstGeom prst="straightConnector1">
+            <a:avLst/>
+          </a:prstGeom>
+          <a:ln w="28575">
+            <a:solidFill>
+              <a:srgbClr val="C00000"/>
+            </a:solidFill>
+            <a:headEnd type="triangle"/>
+            <a:tailEnd type="triangle"/>
+          </a:ln>
+        </p:spPr>
+        <p:style>
+          <a:lnRef idx="1">
+            <a:schemeClr val="accent1"/>
+          </a:lnRef>
+          <a:fillRef idx="0">
+            <a:schemeClr val="accent1"/>
+          </a:fillRef>
+          <a:effectRef idx="0">
+            <a:schemeClr val="accent1"/>
+          </a:effectRef>
+          <a:fontRef idx="minor">
+            <a:schemeClr val="tx1"/>
+          </a:fontRef>
+        </p:style>
+      </p:cxnSp>
+      <p:sp>
+        <p:nvSpPr>
+          <p:cNvPr id="48" name="Rectangle: Rounded Corners 47">
+            <a:extLst>
+              <a:ext uri="{FF2B5EF4-FFF2-40B4-BE49-F238E27FC236}">
+                <a16:creationId xmlns:a16="http://schemas.microsoft.com/office/drawing/2014/main" id="{3FFF8D1E-448C-43BA-B197-EA6448D360F6}"/>
+              </a:ext>
+            </a:extLst>
+          </p:cNvPr>
+          <p:cNvSpPr/>
+          <p:nvPr/>
+        </p:nvSpPr>
+        <p:spPr>
+          <a:xfrm>
+            <a:off x="3806501" y="3236495"/>
+            <a:ext cx="540000" cy="540000"/>
+          </a:xfrm>
+          <a:prstGeom prst="roundRect">
+            <a:avLst/>
+          </a:prstGeom>
+          <a:solidFill>
+            <a:srgbClr val="C00000"/>
+          </a:solidFill>
+          <a:ln>
+            <a:noFill/>
+          </a:ln>
+        </p:spPr>
+        <p:style>
+          <a:lnRef idx="2">
+            <a:schemeClr val="accent1">
+              <a:shade val="50000"/>
+            </a:schemeClr>
+          </a:lnRef>
+          <a:fillRef idx="1">
+            <a:schemeClr val="accent1"/>
+          </a:fillRef>
+          <a:effectRef idx="0">
+            <a:schemeClr val="accent1"/>
+          </a:effectRef>
+          <a:fontRef idx="minor">
+            <a:schemeClr val="lt1"/>
+          </a:fontRef>
+        </p:style>
+        <p:txBody>
+          <a:bodyPr rtlCol="0" anchor="ctr"/>
+          <a:lstStyle/>
+          <a:p>
+            <a:pPr algn="ctr"/>
+            <a:endParaRPr lang="en-CA"/>
+          </a:p>
+        </p:txBody>
+      </p:sp>
+      <p:pic>
+        <p:nvPicPr>
+          <p:cNvPr id="46" name="Graphic 45" descr="Users outline">
+            <a:extLst>
+              <a:ext uri="{FF2B5EF4-FFF2-40B4-BE49-F238E27FC236}">
+                <a16:creationId xmlns:a16="http://schemas.microsoft.com/office/drawing/2014/main" id="{04B38034-9E94-49C1-AA0B-D2B268CB3584}"/>
+              </a:ext>
+            </a:extLst>
+          </p:cNvPr>
+          <p:cNvPicPr>
+            <a:picLocks noChangeAspect="1"/>
+          </p:cNvPicPr>
+          <p:nvPr/>
+        </p:nvPicPr>
+        <p:blipFill>
+          <a:blip r:embed="rId12">
+            <a:extLst>
+              <a:ext uri="{28A0092B-C50C-407E-A947-70E740481C1C}">
+                <a14:useLocalDpi xmlns:a14="http://schemas.microsoft.com/office/drawing/2010/main" val="0"/>
+              </a:ext>
+              <a:ext uri="{96DAC541-7B7A-43D3-8B79-37D633B846F1}">
+                <asvg:svgBlip xmlns:asvg="http://schemas.microsoft.com/office/drawing/2016/SVG/main" r:embed="rId13"/>
+              </a:ext>
+            </a:extLst>
+          </a:blip>
+          <a:stretch>
+            <a:fillRect/>
+          </a:stretch>
+        </p:blipFill>
+        <p:spPr>
+          <a:xfrm>
+            <a:off x="3806501" y="3236495"/>
+            <a:ext cx="540000" cy="540000"/>
+          </a:xfrm>
+          <a:prstGeom prst="rect">
+            <a:avLst/>
+          </a:prstGeom>
+        </p:spPr>
+      </p:pic>
+      <p:sp>
+        <p:nvSpPr>
+          <p:cNvPr id="49" name="TextBox 48">
+            <a:extLst>
+              <a:ext uri="{FF2B5EF4-FFF2-40B4-BE49-F238E27FC236}">
+                <a16:creationId xmlns:a16="http://schemas.microsoft.com/office/drawing/2014/main" id="{C2FB4584-51E6-4A9F-8F1E-27C4C2B91680}"/>
+              </a:ext>
+            </a:extLst>
+          </p:cNvPr>
+          <p:cNvSpPr txBox="1"/>
+          <p:nvPr/>
+        </p:nvSpPr>
+        <p:spPr>
+          <a:xfrm>
+            <a:off x="3839784" y="3776495"/>
+            <a:ext cx="468089" cy="246221"/>
+          </a:xfrm>
+          <a:prstGeom prst="rect">
+            <a:avLst/>
+          </a:prstGeom>
+          <a:noFill/>
+        </p:spPr>
+        <p:txBody>
+          <a:bodyPr wrap="square" rtlCol="0">
+            <a:spAutoFit/>
+          </a:bodyPr>
+          <a:lstStyle/>
+          <a:p>
+            <a:pPr algn="ctr"/>
+            <a:r>
+              <a:rPr lang="en-CA" sz="1000" b="1" dirty="0">
+                <a:solidFill>
+                  <a:srgbClr val="C00000"/>
+                </a:solidFill>
+              </a:rPr>
+              <a:t>MCLI</a:t>
+            </a:r>
+          </a:p>
+        </p:txBody>
+      </p:sp>
+      <p:cxnSp>
+        <p:nvCxnSpPr>
+          <p:cNvPr id="50" name="Straight Arrow Connector 49">
+            <a:extLst>
+              <a:ext uri="{FF2B5EF4-FFF2-40B4-BE49-F238E27FC236}">
+                <a16:creationId xmlns:a16="http://schemas.microsoft.com/office/drawing/2014/main" id="{A615924C-D2A5-433D-A3C9-5B59752B00D1}"/>
+              </a:ext>
+            </a:extLst>
+          </p:cNvPr>
+          <p:cNvCxnSpPr>
+            <a:cxnSpLocks/>
+          </p:cNvCxnSpPr>
+          <p:nvPr/>
+        </p:nvCxnSpPr>
+        <p:spPr>
+          <a:xfrm flipH="1" flipV="1">
+            <a:off x="3123058" y="2816596"/>
+            <a:ext cx="596660" cy="419899"/>
+          </a:xfrm>
+          <a:prstGeom prst="straightConnector1">
+            <a:avLst/>
+          </a:prstGeom>
+          <a:ln w="28575">
+            <a:solidFill>
+              <a:srgbClr val="C00000"/>
+            </a:solidFill>
+            <a:headEnd type="triangle"/>
+            <a:tailEnd type="triangle"/>
+          </a:ln>
+        </p:spPr>
+        <p:style>
+          <a:lnRef idx="1">
+            <a:schemeClr val="accent1"/>
+          </a:lnRef>
+          <a:fillRef idx="0">
+            <a:schemeClr val="accent1"/>
+          </a:fillRef>
+          <a:effectRef idx="0">
+            <a:schemeClr val="accent1"/>
+          </a:effectRef>
+          <a:fontRef idx="minor">
+            <a:schemeClr val="tx1"/>
+          </a:fontRef>
+        </p:style>
+      </p:cxnSp>
+      <p:cxnSp>
+        <p:nvCxnSpPr>
+          <p:cNvPr id="53" name="Straight Arrow Connector 52">
+            <a:extLst>
+              <a:ext uri="{FF2B5EF4-FFF2-40B4-BE49-F238E27FC236}">
+                <a16:creationId xmlns:a16="http://schemas.microsoft.com/office/drawing/2014/main" id="{F6131F65-F895-44C5-A37F-A2E17EF26BB4}"/>
+              </a:ext>
+            </a:extLst>
+          </p:cNvPr>
+          <p:cNvCxnSpPr>
+            <a:cxnSpLocks/>
+          </p:cNvCxnSpPr>
+          <p:nvPr/>
+        </p:nvCxnSpPr>
+        <p:spPr>
+          <a:xfrm>
+            <a:off x="4071547" y="2816596"/>
+            <a:ext cx="0" cy="360000"/>
+          </a:xfrm>
+          <a:prstGeom prst="straightConnector1">
+            <a:avLst/>
+          </a:prstGeom>
+          <a:ln w="28575">
+            <a:solidFill>
+              <a:srgbClr val="C00000"/>
+            </a:solidFill>
+            <a:headEnd type="triangle"/>
+            <a:tailEnd type="triangle"/>
+          </a:ln>
+        </p:spPr>
+        <p:style>
+          <a:lnRef idx="1">
+            <a:schemeClr val="accent1"/>
+          </a:lnRef>
+          <a:fillRef idx="0">
+            <a:schemeClr val="accent1"/>
+          </a:fillRef>
+          <a:effectRef idx="0">
+            <a:schemeClr val="accent1"/>
+          </a:effectRef>
+          <a:fontRef idx="minor">
+            <a:schemeClr val="tx1"/>
+          </a:fontRef>
+        </p:style>
+      </p:cxnSp>
+      <p:cxnSp>
+        <p:nvCxnSpPr>
+          <p:cNvPr id="54" name="Straight Arrow Connector 53">
+            <a:extLst>
+              <a:ext uri="{FF2B5EF4-FFF2-40B4-BE49-F238E27FC236}">
+                <a16:creationId xmlns:a16="http://schemas.microsoft.com/office/drawing/2014/main" id="{87CA3851-8F87-40A2-9245-E8A709FBA955}"/>
+              </a:ext>
+            </a:extLst>
+          </p:cNvPr>
+          <p:cNvCxnSpPr>
+            <a:cxnSpLocks/>
+          </p:cNvCxnSpPr>
+          <p:nvPr/>
+        </p:nvCxnSpPr>
+        <p:spPr>
+          <a:xfrm flipH="1">
+            <a:off x="4433284" y="2775759"/>
+            <a:ext cx="541733" cy="460736"/>
+          </a:xfrm>
+          <a:prstGeom prst="straightConnector1">
+            <a:avLst/>
+          </a:prstGeom>
+          <a:ln w="28575">
+            <a:solidFill>
+              <a:srgbClr val="C00000"/>
+            </a:solidFill>
+            <a:headEnd type="triangle"/>
+            <a:tailEnd type="triangle"/>
+          </a:ln>
+        </p:spPr>
+        <p:style>
+          <a:lnRef idx="1">
+            <a:schemeClr val="accent1"/>
+          </a:lnRef>
+          <a:fillRef idx="0">
+            <a:schemeClr val="accent1"/>
+          </a:fillRef>
+          <a:effectRef idx="0">
+            <a:schemeClr val="accent1"/>
+          </a:effectRef>
+          <a:fontRef idx="minor">
+            <a:schemeClr val="tx1"/>
+          </a:fontRef>
+        </p:style>
+      </p:cxnSp>
     </p:spTree>
     <p:extLst>
       <p:ext uri="{BB962C8B-B14F-4D97-AF65-F5344CB8AC3E}">
         <p14:creationId xmlns:p14="http://schemas.microsoft.com/office/powerpoint/2010/main" val="4151166785"/>
+      </p:ext>
+    </p:extLst>
+  </p:cSld>
+  <p:clrMapOvr>
+    <a:masterClrMapping/>
+  </p:clrMapOvr>
+</p:sld>
+</file>
+
+<file path=ppt/slides/slide2.xml><?xml version="1.0" encoding="utf-8"?>
+<p:sld xmlns:a="http://schemas.openxmlformats.org/drawingml/2006/main" xmlns:r="http://schemas.openxmlformats.org/officeDocument/2006/relationships" xmlns:p="http://schemas.openxmlformats.org/presentationml/2006/main">
+  <p:cSld>
+    <p:spTree>
+      <p:nvGrpSpPr>
+        <p:cNvPr id="1" name=""/>
+        <p:cNvGrpSpPr/>
+        <p:nvPr/>
+      </p:nvGrpSpPr>
+      <p:grpSpPr>
+        <a:xfrm>
+          <a:off x="0" y="0"/>
+          <a:ext cx="0" cy="0"/>
+          <a:chOff x="0" y="0"/>
+          <a:chExt cx="0" cy="0"/>
+        </a:xfrm>
+      </p:grpSpPr>
+      <p:sp>
+        <p:nvSpPr>
+          <p:cNvPr id="2" name="Title 1">
+            <a:extLst>
+              <a:ext uri="{FF2B5EF4-FFF2-40B4-BE49-F238E27FC236}">
+                <a16:creationId xmlns:a16="http://schemas.microsoft.com/office/drawing/2014/main" id="{A3170391-8B7A-4540-A8F6-025BDA629D59}"/>
+              </a:ext>
+            </a:extLst>
+          </p:cNvPr>
+          <p:cNvSpPr>
+            <a:spLocks noGrp="1"/>
+          </p:cNvSpPr>
+          <p:nvPr>
+            <p:ph type="title"/>
+          </p:nvPr>
+        </p:nvSpPr>
+        <p:spPr/>
+        <p:txBody>
+          <a:bodyPr/>
+          <a:lstStyle/>
+          <a:p>
+            <a:endParaRPr lang="en-CA"/>
+          </a:p>
+        </p:txBody>
+      </p:sp>
+      <p:sp>
+        <p:nvSpPr>
+          <p:cNvPr id="3" name="Content Placeholder 2">
+            <a:extLst>
+              <a:ext uri="{FF2B5EF4-FFF2-40B4-BE49-F238E27FC236}">
+                <a16:creationId xmlns:a16="http://schemas.microsoft.com/office/drawing/2014/main" id="{812B0F56-B9A3-4596-8A9C-4ABCF3E1ED2B}"/>
+              </a:ext>
+            </a:extLst>
+          </p:cNvPr>
+          <p:cNvSpPr>
+            <a:spLocks noGrp="1"/>
+          </p:cNvSpPr>
+          <p:nvPr>
+            <p:ph idx="1"/>
+          </p:nvPr>
+        </p:nvSpPr>
+        <p:spPr/>
+        <p:txBody>
+          <a:bodyPr/>
+          <a:lstStyle/>
+          <a:p>
+            <a:endParaRPr lang="en-CA"/>
+          </a:p>
+        </p:txBody>
+      </p:sp>
+    </p:spTree>
+    <p:extLst>
+      <p:ext uri="{BB962C8B-B14F-4D97-AF65-F5344CB8AC3E}">
+        <p14:creationId xmlns:p14="http://schemas.microsoft.com/office/powerpoint/2010/main" val="2037008933"/>
       </p:ext>
     </p:extLst>
   </p:cSld>

</xml_diff>